<commit_message>
Latest Eric Edits Made
</commit_message>
<xml_diff>
--- a/test/bin/PPOrbitalMechanics.pptx
+++ b/test/bin/PPOrbitalMechanics.pptx
@@ -3870,7 +3870,7 @@
       </p:sp>
       <p:sp>
         <p:nvSpPr>
-          <p:cNvPr id="2" name="PPOval#2"/>
+          <p:cNvPr id="2" name="PPRect#2"/>
           <p:cNvSpPr/>
           <p:nvPr/>
         </p:nvSpPr>
@@ -3879,7 +3879,7 @@
             <a:off x="2739200" y="3513600"/>
             <a:ext cx="614400" cy="614400"/>
           </a:xfrm>
-          <a:prstGeom prst="ellipse">
+          <a:prstGeom prst="rect">
             <a:avLst/>
           </a:prstGeom>
           <a:solidFill>
@@ -3938,7 +3938,7 @@
       </p:sp>
       <p:sp>
         <p:nvSpPr>
-          <p:cNvPr id="3" name="PPOval#3"/>
+          <p:cNvPr id="3" name="PPRect#3"/>
           <p:cNvSpPr/>
           <p:nvPr/>
         </p:nvSpPr>
@@ -3947,7 +3947,7 @@
             <a:off x="7360000" y="3718400"/>
             <a:ext cx="204800" cy="204800"/>
           </a:xfrm>
-          <a:prstGeom prst="ellipse">
+          <a:prstGeom prst="rect">
             <a:avLst/>
           </a:prstGeom>
           <a:solidFill>

</xml_diff>